<commit_message>
Embedding fonts in the presentation
</commit_message>
<xml_diff>
--- a/Team One Pager.pptx
+++ b/Team One Pager.pptx
@@ -1,6 +1,6 @@
 
 <file path=ppt/presentation.xml><?xml version="1.0" encoding="utf-8"?>
-<p:presentation xmlns:a="http://schemas.openxmlformats.org/drawingml/2006/main" xmlns:r="http://schemas.openxmlformats.org/officeDocument/2006/relationships" xmlns:p="http://schemas.openxmlformats.org/presentationml/2006/main" embedTrueTypeFonts="1" saveSubsetFonts="1" autoCompressPictures="0">
+<p:presentation xmlns:a="http://schemas.openxmlformats.org/drawingml/2006/main" xmlns:r="http://schemas.openxmlformats.org/officeDocument/2006/relationships" xmlns:p="http://schemas.openxmlformats.org/presentationml/2006/main" embedTrueTypeFonts="1" autoCompressPictures="0">
   <p:sldMasterIdLst>
     <p:sldMasterId id="2147483648" r:id="rId1"/>
   </p:sldMasterIdLst>
@@ -17,18 +17,30 @@
   <p:notesSz cx="6797675" cy="9926638"/>
   <p:embeddedFontLst>
     <p:embeddedFont>
-      <p:font typeface="adineue PRO TT Black" panose="020B0503020201060004" pitchFamily="34" charset="77"/>
-      <p:bold r:id="rId5"/>
-      <p:boldItalic r:id="rId6"/>
+      <p:font typeface="AdiHaus" panose="02000503020000020004" pitchFamily="2" charset="0"/>
+      <p:regular r:id="rId5"/>
+      <p:bold r:id="rId6"/>
+      <p:italic r:id="rId7"/>
+      <p:boldItalic r:id="rId8"/>
     </p:embeddedFont>
     <p:embeddedFont>
-      <p:font typeface="adineue PRO TT Light" panose="020B0303020201060004" pitchFamily="34" charset="77"/>
-      <p:regular r:id="rId7"/>
-      <p:italic r:id="rId8"/>
+      <p:font typeface="adineue PRO TT Light" panose="020B0303020201060004" pitchFamily="34" charset="0"/>
+      <p:regular r:id="rId9"/>
+      <p:italic r:id="rId10"/>
+    </p:embeddedFont>
+    <p:embeddedFont>
+      <p:font typeface="adineue PRO TT Black" panose="020B0A03020201060004" pitchFamily="34" charset="0"/>
+      <p:bold r:id="rId11"/>
+      <p:boldItalic r:id="rId12"/>
+    </p:embeddedFont>
+    <p:embeddedFont>
+      <p:font typeface="adineue PRO Black" panose="020B0A03020201060004" pitchFamily="34" charset="0"/>
+      <p:bold r:id="rId13"/>
+      <p:boldItalic r:id="rId14"/>
     </p:embeddedFont>
   </p:embeddedFontLst>
   <p:custDataLst>
-    <p:tags r:id="rId9"/>
+    <p:tags r:id="rId15"/>
   </p:custDataLst>
   <p:defaultTextStyle>
     <a:defPPr>
@@ -333,6 +345,10 @@
 </p:presentation>
 </file>
 
+<file path=ppt/revisionInfo.xml><?xml version="1.0" encoding="utf-8"?>
+<p1510:revInfo xmlns:a="http://schemas.openxmlformats.org/drawingml/2006/main" xmlns:r="http://schemas.openxmlformats.org/officeDocument/2006/relationships" xmlns:p1510="http://schemas.microsoft.com/office/powerpoint/2015/10/main"/>
+</file>
+
 <file path=ppt/handoutMasters/handoutMaster1.xml><?xml version="1.0" encoding="utf-8"?>
 <p:handoutMaster xmlns:a="http://schemas.openxmlformats.org/drawingml/2006/main" xmlns:r="http://schemas.openxmlformats.org/officeDocument/2006/relationships" xmlns:p="http://schemas.openxmlformats.org/presentationml/2006/main">
   <p:cSld>
@@ -415,7 +431,7 @@
           <a:p>
             <a:fld id="{C84ABD84-B427-486C-B91D-F8364DDF0A46}" type="datetimeFigureOut">
               <a:rPr lang="x-none" smtClean="0"/>
-              <a:t>12/5/18</a:t>
+              <a:t>5/27/2018</a:t>
             </a:fld>
             <a:endParaRPr lang="x-none"/>
           </a:p>

</xml_diff>